<commit_message>
updated WHO MTM data to more recent download
</commit_message>
<xml_diff>
--- a/05.filter_flow/flow_chart.pptx
+++ b/05.filter_flow/flow_chart.pptx
@@ -259,7 +259,7 @@
           <a:p>
             <a:fld id="{28EA76AA-5C16-0F41-A449-D7CF896F7ED6}" type="datetimeFigureOut">
               <a:rPr lang="en-US" smtClean="0"/>
-              <a:t>7/14/25</a:t>
+              <a:t>7/15/25</a:t>
             </a:fld>
             <a:endParaRPr lang="en-US"/>
           </a:p>
@@ -457,7 +457,7 @@
           <a:p>
             <a:fld id="{28EA76AA-5C16-0F41-A449-D7CF896F7ED6}" type="datetimeFigureOut">
               <a:rPr lang="en-US" smtClean="0"/>
-              <a:t>7/14/25</a:t>
+              <a:t>7/15/25</a:t>
             </a:fld>
             <a:endParaRPr lang="en-US"/>
           </a:p>
@@ -665,7 +665,7 @@
           <a:p>
             <a:fld id="{28EA76AA-5C16-0F41-A449-D7CF896F7ED6}" type="datetimeFigureOut">
               <a:rPr lang="en-US" smtClean="0"/>
-              <a:t>7/14/25</a:t>
+              <a:t>7/15/25</a:t>
             </a:fld>
             <a:endParaRPr lang="en-US"/>
           </a:p>
@@ -863,7 +863,7 @@
           <a:p>
             <a:fld id="{28EA76AA-5C16-0F41-A449-D7CF896F7ED6}" type="datetimeFigureOut">
               <a:rPr lang="en-US" smtClean="0"/>
-              <a:t>7/14/25</a:t>
+              <a:t>7/15/25</a:t>
             </a:fld>
             <a:endParaRPr lang="en-US"/>
           </a:p>
@@ -1138,7 +1138,7 @@
           <a:p>
             <a:fld id="{28EA76AA-5C16-0F41-A449-D7CF896F7ED6}" type="datetimeFigureOut">
               <a:rPr lang="en-US" smtClean="0"/>
-              <a:t>7/14/25</a:t>
+              <a:t>7/15/25</a:t>
             </a:fld>
             <a:endParaRPr lang="en-US"/>
           </a:p>
@@ -1403,7 +1403,7 @@
           <a:p>
             <a:fld id="{28EA76AA-5C16-0F41-A449-D7CF896F7ED6}" type="datetimeFigureOut">
               <a:rPr lang="en-US" smtClean="0"/>
-              <a:t>7/14/25</a:t>
+              <a:t>7/15/25</a:t>
             </a:fld>
             <a:endParaRPr lang="en-US"/>
           </a:p>
@@ -1815,7 +1815,7 @@
           <a:p>
             <a:fld id="{28EA76AA-5C16-0F41-A449-D7CF896F7ED6}" type="datetimeFigureOut">
               <a:rPr lang="en-US" smtClean="0"/>
-              <a:t>7/14/25</a:t>
+              <a:t>7/15/25</a:t>
             </a:fld>
             <a:endParaRPr lang="en-US"/>
           </a:p>
@@ -1956,7 +1956,7 @@
           <a:p>
             <a:fld id="{28EA76AA-5C16-0F41-A449-D7CF896F7ED6}" type="datetimeFigureOut">
               <a:rPr lang="en-US" smtClean="0"/>
-              <a:t>7/14/25</a:t>
+              <a:t>7/15/25</a:t>
             </a:fld>
             <a:endParaRPr lang="en-US"/>
           </a:p>
@@ -2069,7 +2069,7 @@
           <a:p>
             <a:fld id="{28EA76AA-5C16-0F41-A449-D7CF896F7ED6}" type="datetimeFigureOut">
               <a:rPr lang="en-US" smtClean="0"/>
-              <a:t>7/14/25</a:t>
+              <a:t>7/15/25</a:t>
             </a:fld>
             <a:endParaRPr lang="en-US"/>
           </a:p>
@@ -2380,7 +2380,7 @@
           <a:p>
             <a:fld id="{28EA76AA-5C16-0F41-A449-D7CF896F7ED6}" type="datetimeFigureOut">
               <a:rPr lang="en-US" smtClean="0"/>
-              <a:t>7/14/25</a:t>
+              <a:t>7/15/25</a:t>
             </a:fld>
             <a:endParaRPr lang="en-US"/>
           </a:p>
@@ -2668,7 +2668,7 @@
           <a:p>
             <a:fld id="{28EA76AA-5C16-0F41-A449-D7CF896F7ED6}" type="datetimeFigureOut">
               <a:rPr lang="en-US" smtClean="0"/>
-              <a:t>7/14/25</a:t>
+              <a:t>7/15/25</a:t>
             </a:fld>
             <a:endParaRPr lang="en-US"/>
           </a:p>
@@ -2909,7 +2909,7 @@
           <a:p>
             <a:fld id="{28EA76AA-5C16-0F41-A449-D7CF896F7ED6}" type="datetimeFigureOut">
               <a:rPr lang="en-US" smtClean="0"/>
-              <a:t>7/14/25</a:t>
+              <a:t>7/15/25</a:t>
             </a:fld>
             <a:endParaRPr lang="en-US"/>
           </a:p>
@@ -3340,7 +3340,7 @@
         </p:nvSpPr>
         <p:spPr>
           <a:xfrm>
-            <a:off x="4312118" y="1102067"/>
+            <a:off x="4312118" y="1349717"/>
             <a:ext cx="1051635" cy="365786"/>
           </a:xfrm>
           <a:prstGeom prst="rect">
@@ -3404,7 +3404,7 @@
                   <a:schemeClr val="tx1"/>
                 </a:solidFill>
               </a:rPr>
-              <a:t>137 studies, 271 sites</a:t>
+              <a:t>134 studies, 319 sites</a:t>
             </a:r>
           </a:p>
         </p:txBody>
@@ -3423,7 +3423,7 @@
         </p:nvSpPr>
         <p:spPr>
           <a:xfrm>
-            <a:off x="4312118" y="1629853"/>
+            <a:off x="4312118" y="1877503"/>
             <a:ext cx="1051635" cy="365786"/>
           </a:xfrm>
           <a:prstGeom prst="rect">
@@ -3498,7 +3498,7 @@
                   <a:schemeClr val="tx1"/>
                 </a:solidFill>
               </a:rPr>
-              <a:t>130 studies, 260 sites</a:t>
+              <a:t>122 studies, 302 sites</a:t>
             </a:r>
           </a:p>
         </p:txBody>
@@ -3517,7 +3517,7 @@
         </p:nvSpPr>
         <p:spPr>
           <a:xfrm>
-            <a:off x="4312118" y="2157639"/>
+            <a:off x="4312118" y="2405289"/>
             <a:ext cx="1051635" cy="365786"/>
           </a:xfrm>
           <a:prstGeom prst="rect">
@@ -3581,90 +3581,7 @@
                   <a:schemeClr val="tx1"/>
                 </a:solidFill>
               </a:rPr>
-              <a:t>68 studies, 156 sites</a:t>
-            </a:r>
-          </a:p>
-        </p:txBody>
-      </p:sp>
-      <p:sp>
-        <p:nvSpPr>
-          <p:cNvPr id="5" name="Rectangle 4">
-            <a:extLst>
-              <a:ext uri="{FF2B5EF4-FFF2-40B4-BE49-F238E27FC236}">
-                <a16:creationId xmlns:a16="http://schemas.microsoft.com/office/drawing/2014/main" id="{DC68BC56-100B-8CB0-0972-BD58479924F8}"/>
-              </a:ext>
-            </a:extLst>
-          </p:cNvPr>
-          <p:cNvSpPr/>
-          <p:nvPr/>
-        </p:nvSpPr>
-        <p:spPr>
-          <a:xfrm>
-            <a:off x="2922162" y="3030318"/>
-            <a:ext cx="1051635" cy="365786"/>
-          </a:xfrm>
-          <a:prstGeom prst="rect">
-            <a:avLst/>
-          </a:prstGeom>
-          <a:solidFill>
-            <a:schemeClr val="tx2">
-              <a:lumMod val="10000"/>
-              <a:lumOff val="90000"/>
-            </a:schemeClr>
-          </a:solidFill>
-          <a:ln w="6350">
-            <a:solidFill>
-              <a:schemeClr val="tx1"/>
-            </a:solidFill>
-          </a:ln>
-        </p:spPr>
-        <p:style>
-          <a:lnRef idx="2">
-            <a:schemeClr val="accent1">
-              <a:shade val="15000"/>
-            </a:schemeClr>
-          </a:lnRef>
-          <a:fillRef idx="1">
-            <a:schemeClr val="accent1"/>
-          </a:fillRef>
-          <a:effectRef idx="0">
-            <a:schemeClr val="accent1"/>
-          </a:effectRef>
-          <a:fontRef idx="minor">
-            <a:schemeClr val="lt1"/>
-          </a:fontRef>
-        </p:style>
-        <p:txBody>
-          <a:bodyPr lIns="0" tIns="0" rIns="0" bIns="0" rtlCol="0" anchor="ctr"/>
-          <a:lstStyle/>
-          <a:p>
-            <a:pPr algn="ctr"/>
-            <a:r>
-              <a:rPr lang="en-US" sz="600" dirty="0">
-                <a:solidFill>
-                  <a:schemeClr val="tx1"/>
-                </a:solidFill>
-              </a:rPr>
-              <a:t>Unable to verify source</a:t>
-            </a:r>
-          </a:p>
-          <a:p>
-            <a:pPr algn="ctr"/>
-            <a:endParaRPr lang="en-US" sz="200" dirty="0">
-              <a:solidFill>
-                <a:schemeClr val="tx1"/>
-              </a:solidFill>
-            </a:endParaRPr>
-          </a:p>
-          <a:p>
-            <a:pPr algn="ctr"/>
-            <a:r>
-              <a:rPr lang="en-US" sz="600" b="1" dirty="0">
-                <a:solidFill>
-                  <a:schemeClr val="tx1"/>
-                </a:solidFill>
-              </a:rPr>
-              <a:t>1 study, 1 site</a:t>
+              <a:t>92 studies, 228 sites</a:t>
             </a:r>
           </a:p>
         </p:txBody>
@@ -3747,7 +3664,7 @@
                   <a:schemeClr val="tx1"/>
                 </a:solidFill>
               </a:rPr>
-              <a:t>4 studies, 14 sites</a:t>
+              <a:t>6 studies, 16 sites</a:t>
             </a:r>
           </a:p>
         </p:txBody>
@@ -3830,7 +3747,7 @@
                   <a:schemeClr val="tx1"/>
                 </a:solidFill>
               </a:rPr>
-              <a:t>60 studies, 127 sites</a:t>
+              <a:t>83 studies, 198 sites</a:t>
             </a:r>
           </a:p>
         </p:txBody>
@@ -3849,7 +3766,7 @@
         </p:nvSpPr>
         <p:spPr>
           <a:xfrm>
-            <a:off x="4312117" y="2685425"/>
+            <a:off x="4312117" y="2933075"/>
             <a:ext cx="1051635" cy="365786"/>
           </a:xfrm>
           <a:prstGeom prst="rect">
@@ -3913,7 +3830,7 @@
                   <a:schemeClr val="tx1"/>
                 </a:solidFill>
               </a:rPr>
-              <a:t>65 studies, 142 sites</a:t>
+              <a:t>89 studies, 214 sites</a:t>
             </a:r>
           </a:p>
         </p:txBody>
@@ -3996,7 +3913,7 @@
                   <a:schemeClr val="tx1"/>
                 </a:solidFill>
               </a:rPr>
-              <a:t>64 studies, 161 sites</a:t>
+              <a:t>89 studies, 349 sites</a:t>
             </a:r>
           </a:p>
         </p:txBody>
@@ -4079,7 +3996,7 @@
                   <a:schemeClr val="tx1"/>
                 </a:solidFill>
               </a:rPr>
-              <a:t>59 studies, 135 sites</a:t>
+              <a:t>81 studies, 312 sites</a:t>
             </a:r>
           </a:p>
         </p:txBody>
@@ -4178,7 +4095,7 @@
                   <a:schemeClr val="tx1"/>
                 </a:solidFill>
               </a:rPr>
-              <a:t>47 studies, 98 sites</a:t>
+              <a:t>65 studies, 156 sites</a:t>
             </a:r>
           </a:p>
         </p:txBody>
@@ -4261,7 +4178,23 @@
                   <a:schemeClr val="tx1"/>
                 </a:solidFill>
               </a:rPr>
-              <a:t>6 studies, 30 sites</a:t>
+              <a:t>11 studies</a:t>
+            </a:r>
+            <a:r>
+              <a:rPr lang="en-US" sz="600" b="1">
+                <a:solidFill>
+                  <a:schemeClr val="tx1"/>
+                </a:solidFill>
+              </a:rPr>
+              <a:t>, 53 </a:t>
+            </a:r>
+            <a:r>
+              <a:rPr lang="en-US" sz="600" b="1" dirty="0">
+                <a:solidFill>
+                  <a:schemeClr val="tx1"/>
+                </a:solidFill>
+              </a:rPr>
+              <a:t>sites</a:t>
             </a:r>
           </a:p>
         </p:txBody>
@@ -4368,7 +4301,7 @@
         </p:nvCxnSpPr>
         <p:spPr>
           <a:xfrm>
-            <a:off x="4837936" y="1467853"/>
+            <a:off x="4837936" y="1715503"/>
             <a:ext cx="0" cy="162000"/>
           </a:xfrm>
           <a:prstGeom prst="straightConnector1">
@@ -4537,14 +4470,14 @@
             </a:extLst>
           </p:cNvPr>
           <p:cNvCxnSpPr>
-            <a:stCxn id="8" idx="2"/>
+            <a:cxnSpLocks/>
           </p:cNvCxnSpPr>
           <p:nvPr/>
         </p:nvCxnSpPr>
         <p:spPr>
-          <a:xfrm flipH="1">
-            <a:off x="4837934" y="3051211"/>
-            <a:ext cx="1" cy="377789"/>
+          <a:xfrm>
+            <a:off x="4837934" y="3301696"/>
+            <a:ext cx="0" cy="127304"/>
           </a:xfrm>
           <a:prstGeom prst="line">
             <a:avLst/>
@@ -4572,51 +4505,6 @@
       </p:cxnSp>
       <p:cxnSp>
         <p:nvCxnSpPr>
-          <p:cNvPr id="33" name="Straight Connector 32">
-            <a:extLst>
-              <a:ext uri="{FF2B5EF4-FFF2-40B4-BE49-F238E27FC236}">
-                <a16:creationId xmlns:a16="http://schemas.microsoft.com/office/drawing/2014/main" id="{B1CBBA6D-8EDE-FB74-95A0-3F3ABB9AA15E}"/>
-              </a:ext>
-            </a:extLst>
-          </p:cNvPr>
-          <p:cNvCxnSpPr>
-            <a:cxnSpLocks/>
-            <a:stCxn id="5" idx="3"/>
-          </p:cNvCxnSpPr>
-          <p:nvPr/>
-        </p:nvCxnSpPr>
-        <p:spPr>
-          <a:xfrm>
-            <a:off x="3973797" y="3213211"/>
-            <a:ext cx="864137" cy="0"/>
-          </a:xfrm>
-          <a:prstGeom prst="line">
-            <a:avLst/>
-          </a:prstGeom>
-          <a:ln w="12700">
-            <a:solidFill>
-              <a:schemeClr val="tx1"/>
-            </a:solidFill>
-            <a:headEnd type="triangle" w="sm" len="sm"/>
-          </a:ln>
-        </p:spPr>
-        <p:style>
-          <a:lnRef idx="2">
-            <a:schemeClr val="accent1"/>
-          </a:lnRef>
-          <a:fillRef idx="0">
-            <a:schemeClr val="accent1"/>
-          </a:fillRef>
-          <a:effectRef idx="1">
-            <a:schemeClr val="accent1"/>
-          </a:effectRef>
-          <a:fontRef idx="minor">
-            <a:schemeClr val="tx1"/>
-          </a:fontRef>
-        </p:style>
-      </p:cxnSp>
-      <p:cxnSp>
-        <p:nvCxnSpPr>
           <p:cNvPr id="36" name="Straight Arrow Connector 35">
             <a:extLst>
               <a:ext uri="{FF2B5EF4-FFF2-40B4-BE49-F238E27FC236}">
@@ -4632,7 +4520,7 @@
         </p:nvCxnSpPr>
         <p:spPr>
           <a:xfrm>
-            <a:off x="4837936" y="1995639"/>
+            <a:off x="4837936" y="2243289"/>
             <a:ext cx="0" cy="162000"/>
           </a:xfrm>
           <a:prstGeom prst="straightConnector1">
@@ -4677,7 +4565,7 @@
         </p:nvCxnSpPr>
         <p:spPr>
           <a:xfrm flipH="1">
-            <a:off x="4837935" y="2523425"/>
+            <a:off x="4837935" y="2771075"/>
             <a:ext cx="1" cy="162000"/>
           </a:xfrm>
           <a:prstGeom prst="straightConnector1">

</xml_diff>

<commit_message>
updated study_IDs after downloading and checking all papers. Found a few mistakes. Updated filtering flowchart and ICC plot
</commit_message>
<xml_diff>
--- a/05.filter_flow/flow_chart.pptx
+++ b/05.filter_flow/flow_chart.pptx
@@ -3340,7 +3340,7 @@
         </p:nvSpPr>
         <p:spPr>
           <a:xfrm>
-            <a:off x="4312118" y="1349717"/>
+            <a:off x="4312118" y="1142681"/>
             <a:ext cx="1051635" cy="365786"/>
           </a:xfrm>
           <a:prstGeom prst="rect">
@@ -3404,7 +3404,7 @@
                   <a:schemeClr val="tx1"/>
                 </a:solidFill>
               </a:rPr>
-              <a:t>134 studies, 319 sites</a:t>
+              <a:t>134 studies, 328 sites</a:t>
             </a:r>
           </a:p>
         </p:txBody>
@@ -3423,7 +3423,7 @@
         </p:nvSpPr>
         <p:spPr>
           <a:xfrm>
-            <a:off x="4312118" y="1877503"/>
+            <a:off x="4312118" y="1670467"/>
             <a:ext cx="1051635" cy="365786"/>
           </a:xfrm>
           <a:prstGeom prst="rect">
@@ -3498,7 +3498,7 @@
                   <a:schemeClr val="tx1"/>
                 </a:solidFill>
               </a:rPr>
-              <a:t>122 studies, 302 sites</a:t>
+              <a:t>122 studies, 311 sites</a:t>
             </a:r>
           </a:p>
         </p:txBody>
@@ -3517,7 +3517,7 @@
         </p:nvSpPr>
         <p:spPr>
           <a:xfrm>
-            <a:off x="4312118" y="2405289"/>
+            <a:off x="4312118" y="2198253"/>
             <a:ext cx="1051635" cy="365786"/>
           </a:xfrm>
           <a:prstGeom prst="rect">
@@ -3581,7 +3581,7 @@
                   <a:schemeClr val="tx1"/>
                 </a:solidFill>
               </a:rPr>
-              <a:t>92 studies, 228 sites</a:t>
+              <a:t>90 studies, 229 sites</a:t>
             </a:r>
           </a:p>
         </p:txBody>
@@ -3747,7 +3747,7 @@
                   <a:schemeClr val="tx1"/>
                 </a:solidFill>
               </a:rPr>
-              <a:t>83 studies, 198 sites</a:t>
+              <a:t>76 studies, 178 sites</a:t>
             </a:r>
           </a:p>
         </p:txBody>
@@ -3766,7 +3766,7 @@
         </p:nvSpPr>
         <p:spPr>
           <a:xfrm>
-            <a:off x="4312117" y="2933075"/>
+            <a:off x="4312117" y="2726039"/>
             <a:ext cx="1051635" cy="365786"/>
           </a:xfrm>
           <a:prstGeom prst="rect">
@@ -3830,7 +3830,7 @@
                   <a:schemeClr val="tx1"/>
                 </a:solidFill>
               </a:rPr>
-              <a:t>89 studies, 214 sites</a:t>
+              <a:t>87 studies, 215 sites</a:t>
             </a:r>
           </a:p>
         </p:txBody>
@@ -3913,7 +3913,7 @@
                   <a:schemeClr val="tx1"/>
                 </a:solidFill>
               </a:rPr>
-              <a:t>89 studies, 349 sites</a:t>
+              <a:t>82 studies, 329 sites</a:t>
             </a:r>
           </a:p>
         </p:txBody>
@@ -3996,7 +3996,7 @@
                   <a:schemeClr val="tx1"/>
                 </a:solidFill>
               </a:rPr>
-              <a:t>81 studies, 312 sites</a:t>
+              <a:t>75 studies, 302 sites</a:t>
             </a:r>
           </a:p>
         </p:txBody>
@@ -4095,7 +4095,7 @@
                   <a:schemeClr val="tx1"/>
                 </a:solidFill>
               </a:rPr>
-              <a:t>65 studies, 156 sites</a:t>
+              <a:t>60 studies, 148 sites</a:t>
             </a:r>
           </a:p>
         </p:txBody>
@@ -4178,23 +4178,7 @@
                   <a:schemeClr val="tx1"/>
                 </a:solidFill>
               </a:rPr>
-              <a:t>11 studies</a:t>
-            </a:r>
-            <a:r>
-              <a:rPr lang="en-US" sz="600" b="1">
-                <a:solidFill>
-                  <a:schemeClr val="tx1"/>
-                </a:solidFill>
-              </a:rPr>
-              <a:t>, 53 </a:t>
-            </a:r>
-            <a:r>
-              <a:rPr lang="en-US" sz="600" b="1" dirty="0">
-                <a:solidFill>
-                  <a:schemeClr val="tx1"/>
-                </a:solidFill>
-              </a:rPr>
-              <a:t>sites</a:t>
+              <a:t>9 studies, 49 sites</a:t>
             </a:r>
           </a:p>
         </p:txBody>
@@ -4301,7 +4285,7 @@
         </p:nvCxnSpPr>
         <p:spPr>
           <a:xfrm>
-            <a:off x="4837936" y="1715503"/>
+            <a:off x="4837936" y="1508467"/>
             <a:ext cx="0" cy="162000"/>
           </a:xfrm>
           <a:prstGeom prst="straightConnector1">
@@ -4471,13 +4455,14 @@
           </p:cNvPr>
           <p:cNvCxnSpPr>
             <a:cxnSpLocks/>
+            <a:stCxn id="8" idx="2"/>
           </p:cNvCxnSpPr>
           <p:nvPr/>
         </p:nvCxnSpPr>
         <p:spPr>
-          <a:xfrm>
-            <a:off x="4837934" y="3301696"/>
-            <a:ext cx="0" cy="127304"/>
+          <a:xfrm flipH="1">
+            <a:off x="4837934" y="3091825"/>
+            <a:ext cx="1" cy="337175"/>
           </a:xfrm>
           <a:prstGeom prst="line">
             <a:avLst/>
@@ -4520,7 +4505,7 @@
         </p:nvCxnSpPr>
         <p:spPr>
           <a:xfrm>
-            <a:off x="4837936" y="2243289"/>
+            <a:off x="4837936" y="2036253"/>
             <a:ext cx="0" cy="162000"/>
           </a:xfrm>
           <a:prstGeom prst="straightConnector1">
@@ -4565,7 +4550,7 @@
         </p:nvCxnSpPr>
         <p:spPr>
           <a:xfrm flipH="1">
-            <a:off x="4837935" y="2771075"/>
+            <a:off x="4837935" y="2564039"/>
             <a:ext cx="1" cy="162000"/>
           </a:xfrm>
           <a:prstGeom prst="straightConnector1">
@@ -5091,6 +5076,134 @@
           <a:xfrm>
             <a:off x="7074497" y="4794735"/>
             <a:ext cx="0" cy="215788"/>
+          </a:xfrm>
+          <a:prstGeom prst="straightConnector1">
+            <a:avLst/>
+          </a:prstGeom>
+          <a:ln w="12700">
+            <a:solidFill>
+              <a:schemeClr val="tx1"/>
+            </a:solidFill>
+            <a:tailEnd type="triangle" w="sm" len="sm"/>
+          </a:ln>
+        </p:spPr>
+        <p:style>
+          <a:lnRef idx="2">
+            <a:schemeClr val="accent1"/>
+          </a:lnRef>
+          <a:fillRef idx="0">
+            <a:schemeClr val="accent1"/>
+          </a:fillRef>
+          <a:effectRef idx="1">
+            <a:schemeClr val="accent1"/>
+          </a:effectRef>
+          <a:fontRef idx="minor">
+            <a:schemeClr val="tx1"/>
+          </a:fontRef>
+        </p:style>
+      </p:cxnSp>
+      <p:sp>
+        <p:nvSpPr>
+          <p:cNvPr id="16" name="Rectangle 15">
+            <a:extLst>
+              <a:ext uri="{FF2B5EF4-FFF2-40B4-BE49-F238E27FC236}">
+                <a16:creationId xmlns:a16="http://schemas.microsoft.com/office/drawing/2014/main" id="{4A9B6EBF-6018-115F-922C-B412B41FEF73}"/>
+              </a:ext>
+            </a:extLst>
+          </p:cNvPr>
+          <p:cNvSpPr/>
+          <p:nvPr/>
+        </p:nvSpPr>
+        <p:spPr>
+          <a:xfrm>
+            <a:off x="2945815" y="3031877"/>
+            <a:ext cx="1051635" cy="365786"/>
+          </a:xfrm>
+          <a:prstGeom prst="rect">
+            <a:avLst/>
+          </a:prstGeom>
+          <a:solidFill>
+            <a:schemeClr val="tx2">
+              <a:lumMod val="10000"/>
+              <a:lumOff val="90000"/>
+            </a:schemeClr>
+          </a:solidFill>
+          <a:ln w="6350">
+            <a:solidFill>
+              <a:schemeClr val="tx1"/>
+            </a:solidFill>
+          </a:ln>
+        </p:spPr>
+        <p:style>
+          <a:lnRef idx="2">
+            <a:schemeClr val="accent1">
+              <a:shade val="15000"/>
+            </a:schemeClr>
+          </a:lnRef>
+          <a:fillRef idx="1">
+            <a:schemeClr val="accent1"/>
+          </a:fillRef>
+          <a:effectRef idx="0">
+            <a:schemeClr val="accent1"/>
+          </a:effectRef>
+          <a:fontRef idx="minor">
+            <a:schemeClr val="lt1"/>
+          </a:fontRef>
+        </p:style>
+        <p:txBody>
+          <a:bodyPr lIns="0" tIns="0" rIns="0" bIns="0" rtlCol="0" anchor="ctr"/>
+          <a:lstStyle/>
+          <a:p>
+            <a:pPr algn="ctr"/>
+            <a:r>
+              <a:rPr lang="en-US" sz="600" dirty="0">
+                <a:solidFill>
+                  <a:schemeClr val="tx1"/>
+                </a:solidFill>
+              </a:rPr>
+              <a:t>Unable to verify source, or duplication of existing data</a:t>
+            </a:r>
+          </a:p>
+          <a:p>
+            <a:pPr algn="ctr"/>
+            <a:endParaRPr lang="en-US" sz="200" dirty="0">
+              <a:solidFill>
+                <a:schemeClr val="tx1"/>
+              </a:solidFill>
+            </a:endParaRPr>
+          </a:p>
+          <a:p>
+            <a:pPr algn="ctr"/>
+            <a:r>
+              <a:rPr lang="en-US" sz="600" b="1" dirty="0">
+                <a:solidFill>
+                  <a:schemeClr val="tx1"/>
+                </a:solidFill>
+              </a:rPr>
+              <a:t>5 studies, 21 sites</a:t>
+            </a:r>
+          </a:p>
+        </p:txBody>
+      </p:sp>
+      <p:cxnSp>
+        <p:nvCxnSpPr>
+          <p:cNvPr id="20" name="Straight Arrow Connector 19">
+            <a:extLst>
+              <a:ext uri="{FF2B5EF4-FFF2-40B4-BE49-F238E27FC236}">
+                <a16:creationId xmlns:a16="http://schemas.microsoft.com/office/drawing/2014/main" id="{B6427DC0-ADCD-A1A9-C15E-4FA86A6D33B4}"/>
+              </a:ext>
+            </a:extLst>
+          </p:cNvPr>
+          <p:cNvCxnSpPr>
+            <a:cxnSpLocks/>
+            <a:endCxn id="16" idx="3"/>
+          </p:cNvCxnSpPr>
+          <p:nvPr/>
+        </p:nvCxnSpPr>
+        <p:spPr>
+          <a:xfrm flipH="1">
+            <a:off x="3997450" y="3214770"/>
+            <a:ext cx="840483" cy="0"/>
           </a:xfrm>
           <a:prstGeom prst="straightConnector1">
             <a:avLst/>

</xml_diff>